<commit_message>
update: Gold Standard; diagramm
</commit_message>
<xml_diff>
--- a/docs/Weekly/08-17-22-Weekly.pptx
+++ b/docs/Weekly/08-17-22-Weekly.pptx
@@ -6,10 +6,10 @@
   </p:sldMasterIdLst>
   <p:sldIdLst>
     <p:sldId id="256" r:id="rId2"/>
-    <p:sldId id="257" r:id="rId3"/>
-    <p:sldId id="258" r:id="rId4"/>
-    <p:sldId id="260" r:id="rId5"/>
-    <p:sldId id="261" r:id="rId6"/>
+    <p:sldId id="258" r:id="rId3"/>
+    <p:sldId id="259" r:id="rId4"/>
+    <p:sldId id="261" r:id="rId5"/>
+    <p:sldId id="262" r:id="rId6"/>
   </p:sldIdLst>
   <p:sldSz cx="18288000" cy="10287000"/>
   <p:notesSz cx="6858000" cy="9144000"/>
@@ -327,7 +327,7 @@
             <a:fld id="{1D8BD707-D9CF-40AE-B4C6-C98DA3205C09}" type="datetimeFigureOut">
               <a:rPr lang="en-US" smtClean="0"/>
               <a:pPr/>
-              <a:t>8/17/2022</a:t>
+              <a:t>11/9/2022</a:t>
             </a:fld>
             <a:endParaRPr lang="en-US"/>
           </a:p>
@@ -492,7 +492,7 @@
             <a:fld id="{1D8BD707-D9CF-40AE-B4C6-C98DA3205C09}" type="datetimeFigureOut">
               <a:rPr lang="en-US" smtClean="0"/>
               <a:pPr/>
-              <a:t>8/17/2022</a:t>
+              <a:t>11/9/2022</a:t>
             </a:fld>
             <a:endParaRPr lang="en-US"/>
           </a:p>
@@ -667,7 +667,7 @@
             <a:fld id="{1D8BD707-D9CF-40AE-B4C6-C98DA3205C09}" type="datetimeFigureOut">
               <a:rPr lang="en-US" smtClean="0"/>
               <a:pPr/>
-              <a:t>8/17/2022</a:t>
+              <a:t>11/9/2022</a:t>
             </a:fld>
             <a:endParaRPr lang="en-US"/>
           </a:p>
@@ -832,7 +832,7 @@
             <a:fld id="{1D8BD707-D9CF-40AE-B4C6-C98DA3205C09}" type="datetimeFigureOut">
               <a:rPr lang="en-US" smtClean="0"/>
               <a:pPr/>
-              <a:t>8/17/2022</a:t>
+              <a:t>11/9/2022</a:t>
             </a:fld>
             <a:endParaRPr lang="en-US"/>
           </a:p>
@@ -1074,7 +1074,7 @@
             <a:fld id="{1D8BD707-D9CF-40AE-B4C6-C98DA3205C09}" type="datetimeFigureOut">
               <a:rPr lang="en-US" smtClean="0"/>
               <a:pPr/>
-              <a:t>8/17/2022</a:t>
+              <a:t>11/9/2022</a:t>
             </a:fld>
             <a:endParaRPr lang="en-US"/>
           </a:p>
@@ -1356,7 +1356,7 @@
             <a:fld id="{1D8BD707-D9CF-40AE-B4C6-C98DA3205C09}" type="datetimeFigureOut">
               <a:rPr lang="en-US" smtClean="0"/>
               <a:pPr/>
-              <a:t>8/17/2022</a:t>
+              <a:t>11/9/2022</a:t>
             </a:fld>
             <a:endParaRPr lang="en-US"/>
           </a:p>
@@ -1772,7 +1772,7 @@
             <a:fld id="{1D8BD707-D9CF-40AE-B4C6-C98DA3205C09}" type="datetimeFigureOut">
               <a:rPr lang="en-US" smtClean="0"/>
               <a:pPr/>
-              <a:t>8/17/2022</a:t>
+              <a:t>11/9/2022</a:t>
             </a:fld>
             <a:endParaRPr lang="en-US"/>
           </a:p>
@@ -1886,7 +1886,7 @@
             <a:fld id="{1D8BD707-D9CF-40AE-B4C6-C98DA3205C09}" type="datetimeFigureOut">
               <a:rPr lang="en-US" smtClean="0"/>
               <a:pPr/>
-              <a:t>8/17/2022</a:t>
+              <a:t>11/9/2022</a:t>
             </a:fld>
             <a:endParaRPr lang="en-US"/>
           </a:p>
@@ -1978,7 +1978,7 @@
             <a:fld id="{1D8BD707-D9CF-40AE-B4C6-C98DA3205C09}" type="datetimeFigureOut">
               <a:rPr lang="en-US" smtClean="0"/>
               <a:pPr/>
-              <a:t>8/17/2022</a:t>
+              <a:t>11/9/2022</a:t>
             </a:fld>
             <a:endParaRPr lang="en-US"/>
           </a:p>
@@ -2250,7 +2250,7 @@
             <a:fld id="{1D8BD707-D9CF-40AE-B4C6-C98DA3205C09}" type="datetimeFigureOut">
               <a:rPr lang="en-US" smtClean="0"/>
               <a:pPr/>
-              <a:t>8/17/2022</a:t>
+              <a:t>11/9/2022</a:t>
             </a:fld>
             <a:endParaRPr lang="en-US"/>
           </a:p>
@@ -2499,7 +2499,7 @@
             <a:fld id="{1D8BD707-D9CF-40AE-B4C6-C98DA3205C09}" type="datetimeFigureOut">
               <a:rPr lang="en-US" smtClean="0"/>
               <a:pPr/>
-              <a:t>8/17/2022</a:t>
+              <a:t>11/9/2022</a:t>
             </a:fld>
             <a:endParaRPr lang="en-US"/>
           </a:p>
@@ -2707,7 +2707,7 @@
             <a:fld id="{1D8BD707-D9CF-40AE-B4C6-C98DA3205C09}" type="datetimeFigureOut">
               <a:rPr lang="en-US" smtClean="0"/>
               <a:pPr/>
-              <a:t>8/17/2022</a:t>
+              <a:t>11/9/2022</a:t>
             </a:fld>
             <a:endParaRPr lang="en-US"/>
           </a:p>
@@ -3254,8 +3254,8 @@
         </p:nvSpPr>
         <p:spPr>
           <a:xfrm>
-            <a:off x="1028700" y="1381096"/>
-            <a:ext cx="11980879" cy="1025207"/>
+            <a:off x="1219200" y="800100"/>
+            <a:ext cx="6189679" cy="1076959"/>
           </a:xfrm>
           <a:prstGeom prst="rect">
             <a:avLst/>
@@ -3269,729 +3269,295 @@
           <a:p>
             <a:pPr marL="0" lvl="0" indent="0">
               <a:lnSpc>
-                <a:spcPts val="7947"/>
+                <a:spcPts val="8304"/>
               </a:lnSpc>
             </a:pPr>
             <a:r>
-              <a:rPr lang="en-US" sz="7224">
+              <a:rPr lang="en-US" sz="7549" dirty="0">
                 <a:solidFill>
                   <a:srgbClr val="FFFFFF"/>
                 </a:solidFill>
-                <a:latin typeface="Radley"/>
+                <a:latin typeface="Radley Bold"/>
               </a:rPr>
-              <a:t>Agenda</a:t>
-            </a:r>
-          </a:p>
-        </p:txBody>
-      </p:sp>
-      <p:sp>
-        <p:nvSpPr>
-          <p:cNvPr id="3" name="TextBox 3"/>
+              <a:t>Updates</a:t>
+            </a:r>
+          </a:p>
+        </p:txBody>
+      </p:sp>
+      <p:sp>
+        <p:nvSpPr>
+          <p:cNvPr id="4" name="TextBox 3">
+            <a:extLst>
+              <a:ext uri="{FF2B5EF4-FFF2-40B4-BE49-F238E27FC236}">
+                <a16:creationId xmlns:a16="http://schemas.microsoft.com/office/drawing/2014/main" id="{B446DB61-E73C-D60B-92D1-2C3348E2B664}"/>
+              </a:ext>
+            </a:extLst>
+          </p:cNvPr>
           <p:cNvSpPr txBox="1"/>
           <p:nvPr/>
         </p:nvSpPr>
         <p:spPr>
           <a:xfrm>
-            <a:off x="1028700" y="6350883"/>
-            <a:ext cx="4587801" cy="563912"/>
+            <a:off x="1219200" y="2247900"/>
+            <a:ext cx="16459200" cy="6765763"/>
           </a:xfrm>
           <a:prstGeom prst="rect">
             <a:avLst/>
           </a:prstGeom>
         </p:spPr>
         <p:txBody>
-          <a:bodyPr lIns="0" tIns="0" rIns="0" bIns="0" rtlCol="0" anchor="t">
+          <a:bodyPr wrap="square" lIns="0" tIns="0" rIns="0" bIns="0" rtlCol="0" anchor="t">
             <a:spAutoFit/>
           </a:bodyPr>
           <a:lstStyle/>
           <a:p>
-            <a:pPr algn="ctr">
+            <a:pPr marL="571500" indent="-571500">
               <a:lnSpc>
-                <a:spcPts val="4618"/>
+                <a:spcPts val="5319"/>
               </a:lnSpc>
               <a:spcBef>
                 <a:spcPct val="0"/>
               </a:spcBef>
+              <a:buFont typeface="Arial" panose="020B0604020202020204" pitchFamily="34" charset="0"/>
+              <a:buChar char="•"/>
             </a:pPr>
             <a:r>
-              <a:rPr lang="en-US" sz="3298">
+              <a:rPr lang="de-DE" sz="3799" dirty="0">
                 <a:solidFill>
                   <a:srgbClr val="FFFFFF"/>
                 </a:solidFill>
-                <a:latin typeface="Open Sans"/>
+                <a:latin typeface="Radley Bold"/>
               </a:rPr>
-              <a:t>Updates</a:t>
-            </a:r>
-          </a:p>
-        </p:txBody>
-      </p:sp>
-      <p:sp>
-        <p:nvSpPr>
-          <p:cNvPr id="4" name="TextBox 4"/>
-          <p:cNvSpPr txBox="1"/>
-          <p:nvPr/>
-        </p:nvSpPr>
-        <p:spPr>
-          <a:xfrm>
-            <a:off x="1028700" y="7176770"/>
-            <a:ext cx="4587801" cy="448310"/>
-          </a:xfrm>
-          <a:prstGeom prst="rect">
-            <a:avLst/>
-          </a:prstGeom>
-        </p:spPr>
-        <p:txBody>
-          <a:bodyPr lIns="0" tIns="0" rIns="0" bIns="0" rtlCol="0" anchor="t">
-            <a:spAutoFit/>
-          </a:bodyPr>
-          <a:lstStyle/>
-          <a:p>
-            <a:pPr marL="0" lvl="0" indent="0" algn="ctr">
+              <a:t>Gold </a:t>
+            </a:r>
+            <a:r>
+              <a:rPr lang="de-DE" sz="3799" dirty="0" err="1">
+                <a:solidFill>
+                  <a:srgbClr val="FFFFFF"/>
+                </a:solidFill>
+                <a:latin typeface="Radley Bold"/>
+              </a:rPr>
+              <a:t>standard</a:t>
+            </a:r>
+            <a:endParaRPr lang="de-DE" sz="3799" dirty="0">
+              <a:solidFill>
+                <a:srgbClr val="FFFFFF"/>
+              </a:solidFill>
+              <a:latin typeface="Radley Bold"/>
+            </a:endParaRPr>
+          </a:p>
+          <a:p>
+            <a:pPr marL="1028700" lvl="1" indent="-571500">
               <a:lnSpc>
-                <a:spcPts val="3640"/>
-              </a:lnSpc>
-            </a:pPr>
-            <a:r>
-              <a:rPr lang="de-DE" sz="2600" dirty="0">
-                <a:solidFill>
-                  <a:srgbClr val="FFFFFF"/>
-                </a:solidFill>
-                <a:latin typeface="Open Sans"/>
-              </a:rPr>
-              <a:t>Architektur</a:t>
-            </a:r>
-            <a:r>
-              <a:rPr lang="en-US" sz="2600" dirty="0">
-                <a:solidFill>
-                  <a:srgbClr val="FFFFFF"/>
-                </a:solidFill>
-                <a:latin typeface="Open Sans"/>
-              </a:rPr>
-              <a:t>, 3 </a:t>
-            </a:r>
-            <a:r>
-              <a:rPr lang="en-US" sz="2600" dirty="0" err="1">
-                <a:solidFill>
-                  <a:srgbClr val="FFFFFF"/>
-                </a:solidFill>
-                <a:latin typeface="Open Sans"/>
-              </a:rPr>
-              <a:t>Regeln</a:t>
-            </a:r>
-            <a:r>
-              <a:rPr lang="en-US" sz="2600" dirty="0">
-                <a:solidFill>
-                  <a:srgbClr val="FFFFFF"/>
-                </a:solidFill>
-                <a:latin typeface="Open Sans"/>
-              </a:rPr>
-              <a:t> </a:t>
-            </a:r>
-            <a:r>
-              <a:rPr lang="en-US" sz="2600" dirty="0" err="1">
-                <a:solidFill>
-                  <a:srgbClr val="FFFFFF"/>
-                </a:solidFill>
-                <a:latin typeface="Open Sans"/>
-              </a:rPr>
-              <a:t>impl</a:t>
-            </a:r>
-            <a:r>
-              <a:rPr lang="en-US" sz="2600" dirty="0">
-                <a:solidFill>
-                  <a:srgbClr val="FFFFFF"/>
-                </a:solidFill>
-                <a:latin typeface="Open Sans"/>
-              </a:rPr>
-              <a:t>. </a:t>
-            </a:r>
-          </a:p>
-        </p:txBody>
-      </p:sp>
-      <p:grpSp>
-        <p:nvGrpSpPr>
-          <p:cNvPr id="5" name="Group 5"/>
-          <p:cNvGrpSpPr/>
-          <p:nvPr/>
-        </p:nvGrpSpPr>
-        <p:grpSpPr>
-          <a:xfrm>
-            <a:off x="2681851" y="4177953"/>
-            <a:ext cx="1281500" cy="1279757"/>
-            <a:chOff x="0" y="0"/>
-            <a:chExt cx="1708666" cy="1706343"/>
-          </a:xfrm>
-        </p:grpSpPr>
-        <p:grpSp>
-          <p:nvGrpSpPr>
-            <p:cNvPr id="6" name="Group 6"/>
-            <p:cNvGrpSpPr/>
-            <p:nvPr/>
-          </p:nvGrpSpPr>
-          <p:grpSpPr>
-            <a:xfrm>
-              <a:off x="0" y="0"/>
-              <a:ext cx="1708666" cy="1706343"/>
-              <a:chOff x="0" y="0"/>
-              <a:chExt cx="6350000" cy="6350000"/>
-            </a:xfrm>
-          </p:grpSpPr>
-          <p:sp>
-            <p:nvSpPr>
-              <p:cNvPr id="7" name="Freeform 7"/>
-              <p:cNvSpPr/>
-              <p:nvPr/>
-            </p:nvSpPr>
-            <p:spPr>
-              <a:xfrm>
-                <a:off x="14167" y="0"/>
-                <a:ext cx="6321665" cy="6350000"/>
-              </a:xfrm>
-              <a:custGeom>
-                <a:avLst/>
-                <a:gdLst/>
-                <a:ahLst/>
-                <a:cxnLst/>
-                <a:rect l="l" t="t" r="r" b="b"/>
-                <a:pathLst>
-                  <a:path w="6321665" h="6350000">
-                    <a:moveTo>
-                      <a:pt x="3160833" y="0"/>
-                    </a:moveTo>
-                    <a:lnTo>
-                      <a:pt x="3160833" y="0"/>
-                    </a:lnTo>
-                    <a:cubicBezTo>
-                      <a:pt x="4908795" y="7817"/>
-                      <a:pt x="6321666" y="1427021"/>
-                      <a:pt x="6321666" y="3175000"/>
-                    </a:cubicBezTo>
-                    <a:cubicBezTo>
-                      <a:pt x="6321666" y="4922979"/>
-                      <a:pt x="4908795" y="6342183"/>
-                      <a:pt x="3160833" y="6350000"/>
-                    </a:cubicBezTo>
-                    <a:cubicBezTo>
-                      <a:pt x="1412871" y="6342183"/>
-                      <a:pt x="0" y="4922979"/>
-                      <a:pt x="0" y="3175000"/>
-                    </a:cubicBezTo>
-                    <a:cubicBezTo>
-                      <a:pt x="0" y="1427021"/>
-                      <a:pt x="1412871" y="7817"/>
-                      <a:pt x="3160833" y="0"/>
-                    </a:cubicBezTo>
-                    <a:close/>
-                  </a:path>
-                </a:pathLst>
-              </a:custGeom>
-              <a:solidFill>
-                <a:srgbClr val="B27E48"/>
-              </a:solidFill>
-            </p:spPr>
-          </p:sp>
-        </p:grpSp>
-        <p:sp>
-          <p:nvSpPr>
-            <p:cNvPr id="8" name="TextBox 8"/>
-            <p:cNvSpPr txBox="1"/>
-            <p:nvPr/>
-          </p:nvSpPr>
-          <p:spPr>
-            <a:xfrm>
-              <a:off x="493457" y="586471"/>
-              <a:ext cx="721752" cy="533400"/>
-            </a:xfrm>
-            <a:prstGeom prst="rect">
-              <a:avLst/>
-            </a:prstGeom>
-          </p:spPr>
-          <p:txBody>
-            <a:bodyPr lIns="0" tIns="0" rIns="0" bIns="0" rtlCol="0" anchor="t">
-              <a:spAutoFit/>
-            </a:bodyPr>
-            <a:lstStyle/>
-            <a:p>
-              <a:pPr marL="0" lvl="0" indent="0" algn="ctr">
-                <a:lnSpc>
-                  <a:spcPts val="3173"/>
-                </a:lnSpc>
-              </a:pPr>
-              <a:r>
-                <a:rPr lang="en-US" sz="2644">
-                  <a:solidFill>
-                    <a:srgbClr val="FFFFFF"/>
-                  </a:solidFill>
-                  <a:latin typeface="Open Sans"/>
-                </a:rPr>
-                <a:t>1</a:t>
-              </a:r>
-            </a:p>
-          </p:txBody>
-        </p:sp>
-      </p:grpSp>
-      <p:sp>
-        <p:nvSpPr>
-          <p:cNvPr id="9" name="TextBox 9"/>
-          <p:cNvSpPr txBox="1"/>
-          <p:nvPr/>
-        </p:nvSpPr>
-        <p:spPr>
-          <a:xfrm>
-            <a:off x="6850099" y="6350883"/>
-            <a:ext cx="4587801" cy="563912"/>
-          </a:xfrm>
-          <a:prstGeom prst="rect">
-            <a:avLst/>
-          </a:prstGeom>
-        </p:spPr>
-        <p:txBody>
-          <a:bodyPr lIns="0" tIns="0" rIns="0" bIns="0" rtlCol="0" anchor="t">
-            <a:spAutoFit/>
-          </a:bodyPr>
-          <a:lstStyle/>
-          <a:p>
-            <a:pPr algn="ctr">
-              <a:lnSpc>
-                <a:spcPts val="4618"/>
+                <a:spcPts val="5319"/>
               </a:lnSpc>
               <a:spcBef>
                 <a:spcPct val="0"/>
               </a:spcBef>
+              <a:buFont typeface="Arial" panose="020B0604020202020204" pitchFamily="34" charset="0"/>
+              <a:buChar char="•"/>
             </a:pPr>
             <a:r>
-              <a:rPr lang="en-US" sz="3298">
+              <a:rPr lang="de-DE" sz="3799" dirty="0">
                 <a:solidFill>
                   <a:srgbClr val="FFFFFF"/>
                 </a:solidFill>
-                <a:latin typeface="Open Sans"/>
+                <a:latin typeface="Radley Bold"/>
               </a:rPr>
-              <a:t>Zeitplanung</a:t>
-            </a:r>
-          </a:p>
-        </p:txBody>
-      </p:sp>
-      <p:sp>
-        <p:nvSpPr>
-          <p:cNvPr id="10" name="TextBox 10"/>
-          <p:cNvSpPr txBox="1"/>
-          <p:nvPr/>
-        </p:nvSpPr>
-        <p:spPr>
-          <a:xfrm>
-            <a:off x="6850099" y="7176770"/>
-            <a:ext cx="4587801" cy="448310"/>
-          </a:xfrm>
-          <a:prstGeom prst="rect">
-            <a:avLst/>
-          </a:prstGeom>
-        </p:spPr>
-        <p:txBody>
-          <a:bodyPr lIns="0" tIns="0" rIns="0" bIns="0" rtlCol="0" anchor="t">
-            <a:spAutoFit/>
-          </a:bodyPr>
-          <a:lstStyle/>
-          <a:p>
-            <a:pPr marL="0" lvl="0" indent="0" algn="ctr">
+              <a:t>Parsen</a:t>
+            </a:r>
+          </a:p>
+          <a:p>
+            <a:pPr marL="1028700" lvl="1" indent="-571500">
               <a:lnSpc>
-                <a:spcPts val="3640"/>
-              </a:lnSpc>
-            </a:pPr>
-            <a:r>
-              <a:rPr lang="en-US" sz="2600" dirty="0">
-                <a:solidFill>
-                  <a:srgbClr val="FFFFFF"/>
-                </a:solidFill>
-                <a:latin typeface="Open Sans"/>
-              </a:rPr>
-              <a:t>Für </a:t>
-            </a:r>
-            <a:r>
-              <a:rPr lang="en-US" sz="2600" dirty="0" err="1">
-                <a:solidFill>
-                  <a:srgbClr val="FFFFFF"/>
-                </a:solidFill>
-                <a:latin typeface="Open Sans"/>
-              </a:rPr>
-              <a:t>nächsten</a:t>
-            </a:r>
-            <a:r>
-              <a:rPr lang="en-US" sz="2600" dirty="0">
-                <a:solidFill>
-                  <a:srgbClr val="FFFFFF"/>
-                </a:solidFill>
-                <a:latin typeface="Open Sans"/>
-              </a:rPr>
-              <a:t> 2 </a:t>
-            </a:r>
-            <a:r>
-              <a:rPr lang="en-US" sz="2600" dirty="0" err="1">
-                <a:solidFill>
-                  <a:srgbClr val="FFFFFF"/>
-                </a:solidFill>
-                <a:latin typeface="Open Sans"/>
-              </a:rPr>
-              <a:t>Wochen</a:t>
-            </a:r>
-            <a:r>
-              <a:rPr lang="en-US" sz="2600" dirty="0">
-                <a:solidFill>
-                  <a:srgbClr val="FFFFFF"/>
-                </a:solidFill>
-                <a:latin typeface="Open Sans"/>
-              </a:rPr>
-              <a:t>?</a:t>
-            </a:r>
-          </a:p>
-        </p:txBody>
-      </p:sp>
-      <p:sp>
-        <p:nvSpPr>
-          <p:cNvPr id="11" name="TextBox 11"/>
-          <p:cNvSpPr txBox="1"/>
-          <p:nvPr/>
-        </p:nvSpPr>
-        <p:spPr>
-          <a:xfrm>
-            <a:off x="12671499" y="6350883"/>
-            <a:ext cx="4587801" cy="563912"/>
-          </a:xfrm>
-          <a:prstGeom prst="rect">
-            <a:avLst/>
-          </a:prstGeom>
-        </p:spPr>
-        <p:txBody>
-          <a:bodyPr lIns="0" tIns="0" rIns="0" bIns="0" rtlCol="0" anchor="t">
-            <a:spAutoFit/>
-          </a:bodyPr>
-          <a:lstStyle/>
-          <a:p>
-            <a:pPr algn="ctr">
-              <a:lnSpc>
-                <a:spcPts val="4618"/>
+                <a:spcPts val="5319"/>
               </a:lnSpc>
               <a:spcBef>
                 <a:spcPct val="0"/>
               </a:spcBef>
+              <a:buFont typeface="Arial" panose="020B0604020202020204" pitchFamily="34" charset="0"/>
+              <a:buChar char="•"/>
             </a:pPr>
             <a:r>
-              <a:rPr lang="en-US" sz="3298">
+              <a:rPr lang="de-DE" sz="3799" dirty="0">
                 <a:solidFill>
                   <a:srgbClr val="FFFFFF"/>
                 </a:solidFill>
-                <a:latin typeface="Open Sans"/>
+                <a:latin typeface="Radley Bold"/>
               </a:rPr>
-              <a:t>Fragen</a:t>
-            </a:r>
-          </a:p>
-        </p:txBody>
-      </p:sp>
-      <p:sp>
-        <p:nvSpPr>
-          <p:cNvPr id="12" name="TextBox 12"/>
-          <p:cNvSpPr txBox="1"/>
-          <p:nvPr/>
-        </p:nvSpPr>
-        <p:spPr>
-          <a:xfrm>
-            <a:off x="12671499" y="7176770"/>
-            <a:ext cx="4587801" cy="448310"/>
-          </a:xfrm>
-          <a:prstGeom prst="rect">
-            <a:avLst/>
-          </a:prstGeom>
-        </p:spPr>
-        <p:txBody>
-          <a:bodyPr lIns="0" tIns="0" rIns="0" bIns="0" rtlCol="0" anchor="t">
-            <a:spAutoFit/>
-          </a:bodyPr>
-          <a:lstStyle/>
-          <a:p>
-            <a:pPr marL="0" lvl="0" indent="0" algn="ctr">
+              <a:t>User/</a:t>
+            </a:r>
+            <a:r>
+              <a:rPr lang="de-DE" sz="3799" dirty="0" err="1">
+                <a:solidFill>
+                  <a:srgbClr val="FFFFFF"/>
+                </a:solidFill>
+                <a:latin typeface="Radley Bold"/>
+              </a:rPr>
+              <a:t>Pet</a:t>
+            </a:r>
+            <a:r>
+              <a:rPr lang="de-DE" sz="3799" dirty="0">
+                <a:solidFill>
+                  <a:srgbClr val="FFFFFF"/>
+                </a:solidFill>
+                <a:latin typeface="Radley Bold"/>
+              </a:rPr>
+              <a:t>/Enterprise</a:t>
+            </a:r>
+          </a:p>
+          <a:p>
+            <a:pPr marL="571500" indent="-571500">
               <a:lnSpc>
-                <a:spcPts val="3640"/>
+                <a:spcPts val="5319"/>
               </a:lnSpc>
+              <a:spcBef>
+                <a:spcPct val="0"/>
+              </a:spcBef>
+              <a:buFont typeface="Arial" panose="020B0604020202020204" pitchFamily="34" charset="0"/>
+              <a:buChar char="•"/>
             </a:pPr>
             <a:r>
-              <a:rPr lang="en-US" sz="2600" dirty="0" err="1">
+              <a:rPr lang="de-DE" sz="3799" dirty="0">
                 <a:solidFill>
                   <a:srgbClr val="FFFFFF"/>
                 </a:solidFill>
-                <a:latin typeface="Open Sans"/>
+                <a:latin typeface="Radley Bold"/>
               </a:rPr>
-              <a:t>Fragen</a:t>
-            </a:r>
-            <a:r>
-              <a:rPr lang="en-US" sz="2600" dirty="0">
+              <a:t>Performance</a:t>
+            </a:r>
+          </a:p>
+          <a:p>
+            <a:pPr marL="1028700" lvl="1" indent="-571500">
+              <a:lnSpc>
+                <a:spcPts val="5319"/>
+              </a:lnSpc>
+              <a:spcBef>
+                <a:spcPct val="0"/>
+              </a:spcBef>
+              <a:buFont typeface="Arial" panose="020B0604020202020204" pitchFamily="34" charset="0"/>
+              <a:buChar char="•"/>
+            </a:pPr>
+            <a:r>
+              <a:rPr lang="de-DE" sz="3799" dirty="0">
                 <a:solidFill>
                   <a:srgbClr val="FFFFFF"/>
                 </a:solidFill>
-                <a:latin typeface="Open Sans"/>
+                <a:latin typeface="Radley Bold"/>
               </a:rPr>
-              <a:t> und </a:t>
-            </a:r>
-            <a:r>
-              <a:rPr lang="en-US" sz="2600" dirty="0" err="1">
+              <a:t>Zeit die Funktion auszuführen</a:t>
+            </a:r>
+          </a:p>
+          <a:p>
+            <a:pPr marL="1028700" lvl="1" indent="-571500">
+              <a:lnSpc>
+                <a:spcPts val="5319"/>
+              </a:lnSpc>
+              <a:spcBef>
+                <a:spcPct val="0"/>
+              </a:spcBef>
+              <a:buFont typeface="Arial" panose="020B0604020202020204" pitchFamily="34" charset="0"/>
+              <a:buChar char="•"/>
+            </a:pPr>
+            <a:r>
+              <a:rPr lang="de-DE" sz="3799" dirty="0">
                 <a:solidFill>
                   <a:srgbClr val="FFFFFF"/>
                 </a:solidFill>
-                <a:latin typeface="Open Sans"/>
+                <a:latin typeface="Radley Bold"/>
               </a:rPr>
-              <a:t>Probleme</a:t>
-            </a:r>
-            <a:endParaRPr lang="en-US" sz="2600" dirty="0">
+              <a:t>Memory </a:t>
+            </a:r>
+            <a:r>
+              <a:rPr lang="de-DE" sz="3799" dirty="0" err="1">
+                <a:solidFill>
+                  <a:srgbClr val="FFFFFF"/>
+                </a:solidFill>
+                <a:latin typeface="Radley Bold"/>
+              </a:rPr>
+              <a:t>usage</a:t>
+            </a:r>
+            <a:endParaRPr lang="de-DE" sz="3799" dirty="0">
               <a:solidFill>
                 <a:srgbClr val="FFFFFF"/>
               </a:solidFill>
-              <a:latin typeface="Open Sans"/>
+              <a:latin typeface="Radley Bold"/>
             </a:endParaRPr>
           </a:p>
-        </p:txBody>
-      </p:sp>
-      <p:grpSp>
-        <p:nvGrpSpPr>
-          <p:cNvPr id="13" name="Group 13"/>
-          <p:cNvGrpSpPr/>
-          <p:nvPr/>
-        </p:nvGrpSpPr>
-        <p:grpSpPr>
-          <a:xfrm>
-            <a:off x="8503250" y="4177953"/>
-            <a:ext cx="1281500" cy="1279757"/>
-            <a:chOff x="0" y="0"/>
-            <a:chExt cx="1708666" cy="1706343"/>
-          </a:xfrm>
-        </p:grpSpPr>
-        <p:grpSp>
-          <p:nvGrpSpPr>
-            <p:cNvPr id="14" name="Group 14"/>
-            <p:cNvGrpSpPr/>
-            <p:nvPr/>
-          </p:nvGrpSpPr>
-          <p:grpSpPr>
-            <a:xfrm>
-              <a:off x="0" y="0"/>
-              <a:ext cx="1708666" cy="1706343"/>
-              <a:chOff x="0" y="0"/>
-              <a:chExt cx="6350000" cy="6350000"/>
-            </a:xfrm>
-          </p:grpSpPr>
-          <p:sp>
-            <p:nvSpPr>
-              <p:cNvPr id="15" name="Freeform 15"/>
-              <p:cNvSpPr/>
-              <p:nvPr/>
-            </p:nvSpPr>
-            <p:spPr>
-              <a:xfrm>
-                <a:off x="14167" y="0"/>
-                <a:ext cx="6321665" cy="6350000"/>
-              </a:xfrm>
-              <a:custGeom>
-                <a:avLst/>
-                <a:gdLst/>
-                <a:ahLst/>
-                <a:cxnLst/>
-                <a:rect l="l" t="t" r="r" b="b"/>
-                <a:pathLst>
-                  <a:path w="6321665" h="6350000">
-                    <a:moveTo>
-                      <a:pt x="3160833" y="0"/>
-                    </a:moveTo>
-                    <a:lnTo>
-                      <a:pt x="3160833" y="0"/>
-                    </a:lnTo>
-                    <a:cubicBezTo>
-                      <a:pt x="4908795" y="7817"/>
-                      <a:pt x="6321666" y="1427021"/>
-                      <a:pt x="6321666" y="3175000"/>
-                    </a:cubicBezTo>
-                    <a:cubicBezTo>
-                      <a:pt x="6321666" y="4922979"/>
-                      <a:pt x="4908795" y="6342183"/>
-                      <a:pt x="3160833" y="6350000"/>
-                    </a:cubicBezTo>
-                    <a:cubicBezTo>
-                      <a:pt x="1412871" y="6342183"/>
-                      <a:pt x="0" y="4922979"/>
-                      <a:pt x="0" y="3175000"/>
-                    </a:cubicBezTo>
-                    <a:cubicBezTo>
-                      <a:pt x="0" y="1427021"/>
-                      <a:pt x="1412871" y="7817"/>
-                      <a:pt x="3160833" y="0"/>
-                    </a:cubicBezTo>
-                    <a:close/>
-                  </a:path>
-                </a:pathLst>
-              </a:custGeom>
+          <a:p>
+            <a:pPr marL="571500" indent="-571500">
+              <a:lnSpc>
+                <a:spcPts val="5319"/>
+              </a:lnSpc>
+              <a:spcBef>
+                <a:spcPct val="0"/>
+              </a:spcBef>
+              <a:buFont typeface="Arial" panose="020B0604020202020204" pitchFamily="34" charset="0"/>
+              <a:buChar char="•"/>
+            </a:pPr>
+            <a:endParaRPr lang="de-DE" sz="3799" dirty="0">
               <a:solidFill>
-                <a:srgbClr val="B27E48"/>
+                <a:srgbClr val="FFFFFF"/>
               </a:solidFill>
-            </p:spPr>
-          </p:sp>
-        </p:grpSp>
-        <p:sp>
-          <p:nvSpPr>
-            <p:cNvPr id="16" name="TextBox 16"/>
-            <p:cNvSpPr txBox="1"/>
-            <p:nvPr/>
-          </p:nvSpPr>
-          <p:spPr>
-            <a:xfrm>
-              <a:off x="493457" y="586471"/>
-              <a:ext cx="721752" cy="533400"/>
-            </a:xfrm>
-            <a:prstGeom prst="rect">
-              <a:avLst/>
-            </a:prstGeom>
-          </p:spPr>
-          <p:txBody>
-            <a:bodyPr lIns="0" tIns="0" rIns="0" bIns="0" rtlCol="0" anchor="t">
-              <a:spAutoFit/>
-            </a:bodyPr>
-            <a:lstStyle/>
-            <a:p>
-              <a:pPr marL="0" lvl="0" indent="0" algn="ctr">
-                <a:lnSpc>
-                  <a:spcPts val="3173"/>
-                </a:lnSpc>
-              </a:pPr>
-              <a:r>
-                <a:rPr lang="en-US" sz="2644">
-                  <a:solidFill>
-                    <a:srgbClr val="FFFFFF"/>
-                  </a:solidFill>
-                  <a:latin typeface="Open Sans"/>
-                </a:rPr>
-                <a:t>2</a:t>
-              </a:r>
-            </a:p>
-          </p:txBody>
-        </p:sp>
-      </p:grpSp>
-      <p:grpSp>
-        <p:nvGrpSpPr>
-          <p:cNvPr id="17" name="Group 17"/>
-          <p:cNvGrpSpPr/>
-          <p:nvPr/>
-        </p:nvGrpSpPr>
-        <p:grpSpPr>
-          <a:xfrm>
-            <a:off x="14324650" y="4177953"/>
-            <a:ext cx="1281500" cy="1279757"/>
-            <a:chOff x="0" y="0"/>
-            <a:chExt cx="1708666" cy="1706343"/>
-          </a:xfrm>
-        </p:grpSpPr>
-        <p:grpSp>
-          <p:nvGrpSpPr>
-            <p:cNvPr id="18" name="Group 18"/>
-            <p:cNvGrpSpPr/>
-            <p:nvPr/>
-          </p:nvGrpSpPr>
-          <p:grpSpPr>
-            <a:xfrm>
-              <a:off x="0" y="0"/>
-              <a:ext cx="1708666" cy="1706343"/>
-              <a:chOff x="0" y="0"/>
-              <a:chExt cx="6350000" cy="6350000"/>
-            </a:xfrm>
-          </p:grpSpPr>
-          <p:sp>
-            <p:nvSpPr>
-              <p:cNvPr id="19" name="Freeform 19"/>
-              <p:cNvSpPr/>
-              <p:nvPr/>
-            </p:nvSpPr>
-            <p:spPr>
-              <a:xfrm>
-                <a:off x="14167" y="0"/>
-                <a:ext cx="6321665" cy="6350000"/>
-              </a:xfrm>
-              <a:custGeom>
-                <a:avLst/>
-                <a:gdLst/>
-                <a:ahLst/>
-                <a:cxnLst/>
-                <a:rect l="l" t="t" r="r" b="b"/>
-                <a:pathLst>
-                  <a:path w="6321665" h="6350000">
-                    <a:moveTo>
-                      <a:pt x="3160833" y="0"/>
-                    </a:moveTo>
-                    <a:lnTo>
-                      <a:pt x="3160833" y="0"/>
-                    </a:lnTo>
-                    <a:cubicBezTo>
-                      <a:pt x="4908795" y="7817"/>
-                      <a:pt x="6321666" y="1427021"/>
-                      <a:pt x="6321666" y="3175000"/>
-                    </a:cubicBezTo>
-                    <a:cubicBezTo>
-                      <a:pt x="6321666" y="4922979"/>
-                      <a:pt x="4908795" y="6342183"/>
-                      <a:pt x="3160833" y="6350000"/>
-                    </a:cubicBezTo>
-                    <a:cubicBezTo>
-                      <a:pt x="1412871" y="6342183"/>
-                      <a:pt x="0" y="4922979"/>
-                      <a:pt x="0" y="3175000"/>
-                    </a:cubicBezTo>
-                    <a:cubicBezTo>
-                      <a:pt x="0" y="1427021"/>
-                      <a:pt x="1412871" y="7817"/>
-                      <a:pt x="3160833" y="0"/>
-                    </a:cubicBezTo>
-                    <a:close/>
-                  </a:path>
-                </a:pathLst>
-              </a:custGeom>
+              <a:latin typeface="Radley Bold"/>
+            </a:endParaRPr>
+          </a:p>
+          <a:p>
+            <a:pPr marL="571500" indent="-571500">
+              <a:lnSpc>
+                <a:spcPts val="5319"/>
+              </a:lnSpc>
+              <a:spcBef>
+                <a:spcPct val="0"/>
+              </a:spcBef>
+              <a:buFont typeface="Arial" panose="020B0604020202020204" pitchFamily="34" charset="0"/>
+              <a:buChar char="•"/>
+            </a:pPr>
+            <a:endParaRPr lang="de-DE" sz="3799" dirty="0">
               <a:solidFill>
-                <a:srgbClr val="B27E48"/>
+                <a:srgbClr val="FFFFFF"/>
               </a:solidFill>
-            </p:spPr>
-          </p:sp>
-        </p:grpSp>
-        <p:sp>
-          <p:nvSpPr>
-            <p:cNvPr id="20" name="TextBox 20"/>
-            <p:cNvSpPr txBox="1"/>
-            <p:nvPr/>
-          </p:nvSpPr>
-          <p:spPr>
-            <a:xfrm>
-              <a:off x="493457" y="586471"/>
-              <a:ext cx="721752" cy="533400"/>
-            </a:xfrm>
-            <a:prstGeom prst="rect">
-              <a:avLst/>
-            </a:prstGeom>
-          </p:spPr>
-          <p:txBody>
-            <a:bodyPr lIns="0" tIns="0" rIns="0" bIns="0" rtlCol="0" anchor="t">
-              <a:spAutoFit/>
-            </a:bodyPr>
-            <a:lstStyle/>
-            <a:p>
-              <a:pPr marL="0" lvl="0" indent="0" algn="ctr">
-                <a:lnSpc>
-                  <a:spcPts val="3173"/>
-                </a:lnSpc>
-              </a:pPr>
-              <a:r>
-                <a:rPr lang="en-US" sz="2644">
-                  <a:solidFill>
-                    <a:srgbClr val="FFFFFF"/>
-                  </a:solidFill>
-                  <a:latin typeface="Open Sans"/>
-                </a:rPr>
-                <a:t>3</a:t>
-              </a:r>
-            </a:p>
-          </p:txBody>
-        </p:sp>
-      </p:grpSp>
+              <a:latin typeface="Radley Bold"/>
+            </a:endParaRPr>
+          </a:p>
+          <a:p>
+            <a:pPr marL="571500" indent="-571500">
+              <a:lnSpc>
+                <a:spcPts val="5319"/>
+              </a:lnSpc>
+              <a:spcBef>
+                <a:spcPct val="0"/>
+              </a:spcBef>
+              <a:buFont typeface="Arial" panose="020B0604020202020204" pitchFamily="34" charset="0"/>
+              <a:buChar char="•"/>
+            </a:pPr>
+            <a:endParaRPr lang="de-DE" sz="3799" dirty="0">
+              <a:solidFill>
+                <a:srgbClr val="FFFFFF"/>
+              </a:solidFill>
+              <a:latin typeface="Radley Bold"/>
+            </a:endParaRPr>
+          </a:p>
+          <a:p>
+            <a:pPr marL="571500" indent="-571500" algn="l">
+              <a:lnSpc>
+                <a:spcPts val="5319"/>
+              </a:lnSpc>
+              <a:spcBef>
+                <a:spcPct val="0"/>
+              </a:spcBef>
+              <a:buFont typeface="Arial" panose="020B0604020202020204" pitchFamily="34" charset="0"/>
+              <a:buChar char="•"/>
+            </a:pPr>
+            <a:endParaRPr lang="de-DE" sz="3799" dirty="0">
+              <a:solidFill>
+                <a:srgbClr val="FFFFFF"/>
+              </a:solidFill>
+              <a:latin typeface="Radley Bold"/>
+            </a:endParaRPr>
+          </a:p>
+        </p:txBody>
+      </p:sp>
     </p:spTree>
   </p:cSld>
   <p:clrMapOvr>
@@ -4063,173 +3629,42 @@
           </a:p>
         </p:txBody>
       </p:sp>
-      <p:sp>
-        <p:nvSpPr>
-          <p:cNvPr id="3" name="TextBox 3"/>
-          <p:cNvSpPr txBox="1"/>
+      <p:pic>
+        <p:nvPicPr>
+          <p:cNvPr id="5" name="Grafik 4">
+            <a:extLst>
+              <a:ext uri="{FF2B5EF4-FFF2-40B4-BE49-F238E27FC236}">
+                <a16:creationId xmlns:a16="http://schemas.microsoft.com/office/drawing/2014/main" id="{19CAEFF1-5721-7CC3-5C9B-C52FA076203A}"/>
+              </a:ext>
+            </a:extLst>
+          </p:cNvPr>
+          <p:cNvPicPr>
+            <a:picLocks noChangeAspect="1"/>
+          </p:cNvPicPr>
           <p:nvPr/>
-        </p:nvSpPr>
+        </p:nvPicPr>
+        <p:blipFill>
+          <a:blip r:embed="rId2"/>
+          <a:stretch>
+            <a:fillRect/>
+          </a:stretch>
+        </p:blipFill>
         <p:spPr>
           <a:xfrm>
-            <a:off x="1219200" y="2247900"/>
-            <a:ext cx="8382000" cy="2687723"/>
+            <a:off x="0" y="1961029"/>
+            <a:ext cx="18288000" cy="6364941"/>
           </a:xfrm>
           <a:prstGeom prst="rect">
             <a:avLst/>
           </a:prstGeom>
         </p:spPr>
-        <p:txBody>
-          <a:bodyPr wrap="square" lIns="0" tIns="0" rIns="0" bIns="0" rtlCol="0" anchor="t">
-            <a:spAutoFit/>
-          </a:bodyPr>
-          <a:lstStyle/>
-          <a:p>
-            <a:pPr marL="571500" indent="-571500" algn="l">
-              <a:lnSpc>
-                <a:spcPts val="5319"/>
-              </a:lnSpc>
-              <a:spcBef>
-                <a:spcPct val="0"/>
-              </a:spcBef>
-              <a:buFont typeface="Arial" panose="020B0604020202020204" pitchFamily="34" charset="0"/>
-              <a:buChar char="•"/>
-            </a:pPr>
-            <a:r>
-              <a:rPr lang="en-US" sz="4000" dirty="0">
-                <a:solidFill>
-                  <a:srgbClr val="FFFFFF"/>
-                </a:solidFill>
-                <a:latin typeface="Radley Bold"/>
-              </a:rPr>
-              <a:t>Pipeline (tests + </a:t>
-            </a:r>
-            <a:r>
-              <a:rPr lang="en-US" sz="4000" dirty="0" err="1">
-                <a:solidFill>
-                  <a:srgbClr val="FFFFFF"/>
-                </a:solidFill>
-                <a:latin typeface="Radley Bold"/>
-              </a:rPr>
-              <a:t>semgrep</a:t>
-            </a:r>
-            <a:r>
-              <a:rPr lang="en-US" sz="4000" dirty="0">
-                <a:solidFill>
-                  <a:srgbClr val="FFFFFF"/>
-                </a:solidFill>
-                <a:latin typeface="Radley Bold"/>
-              </a:rPr>
-              <a:t>)</a:t>
-            </a:r>
-          </a:p>
-          <a:p>
-            <a:pPr marL="571500" indent="-571500" algn="l">
-              <a:lnSpc>
-                <a:spcPts val="5319"/>
-              </a:lnSpc>
-              <a:spcBef>
-                <a:spcPct val="0"/>
-              </a:spcBef>
-              <a:buFont typeface="Arial" panose="020B0604020202020204" pitchFamily="34" charset="0"/>
-              <a:buChar char="•"/>
-            </a:pPr>
-            <a:r>
-              <a:rPr lang="en-US" sz="4000" dirty="0">
-                <a:solidFill>
-                  <a:srgbClr val="FFFFFF"/>
-                </a:solidFill>
-                <a:latin typeface="Radley Bold"/>
-              </a:rPr>
-              <a:t> 5 (</a:t>
-            </a:r>
-            <a:r>
-              <a:rPr lang="en-US" sz="4000" dirty="0" err="1">
-                <a:solidFill>
-                  <a:srgbClr val="FFFFFF"/>
-                </a:solidFill>
-                <a:latin typeface="Radley Bold"/>
-              </a:rPr>
-              <a:t>statische</a:t>
-            </a:r>
-            <a:r>
-              <a:rPr lang="en-US" sz="4000" dirty="0">
-                <a:solidFill>
-                  <a:srgbClr val="FFFFFF"/>
-                </a:solidFill>
-                <a:latin typeface="Radley Bold"/>
-              </a:rPr>
-              <a:t>) Rules + </a:t>
-            </a:r>
-            <a:r>
-              <a:rPr lang="en-US" sz="4000" dirty="0" err="1">
-                <a:solidFill>
-                  <a:srgbClr val="FFFFFF"/>
-                </a:solidFill>
-                <a:latin typeface="Radley Bold"/>
-              </a:rPr>
-              <a:t>doku</a:t>
-            </a:r>
-            <a:r>
-              <a:rPr lang="en-US" sz="4000" dirty="0">
-                <a:solidFill>
-                  <a:srgbClr val="FFFFFF"/>
-                </a:solidFill>
-                <a:latin typeface="Radley Bold"/>
-              </a:rPr>
-              <a:t> + tests </a:t>
-            </a:r>
-          </a:p>
-          <a:p>
-            <a:pPr marL="571500" indent="-571500" algn="l">
-              <a:lnSpc>
-                <a:spcPts val="5319"/>
-              </a:lnSpc>
-              <a:spcBef>
-                <a:spcPct val="0"/>
-              </a:spcBef>
-              <a:buFont typeface="Arial" panose="020B0604020202020204" pitchFamily="34" charset="0"/>
-              <a:buChar char="•"/>
-            </a:pPr>
-            <a:r>
-              <a:rPr lang="en-US" sz="4000" dirty="0">
-                <a:solidFill>
-                  <a:srgbClr val="FFFFFF"/>
-                </a:solidFill>
-                <a:latin typeface="Radley Bold"/>
-              </a:rPr>
-              <a:t>Report</a:t>
-            </a:r>
-          </a:p>
-          <a:p>
-            <a:pPr marL="571500" indent="-571500" algn="l">
-              <a:lnSpc>
-                <a:spcPts val="5319"/>
-              </a:lnSpc>
-              <a:spcBef>
-                <a:spcPct val="0"/>
-              </a:spcBef>
-              <a:buFont typeface="Arial" panose="020B0604020202020204" pitchFamily="34" charset="0"/>
-              <a:buChar char="•"/>
-            </a:pPr>
-            <a:r>
-              <a:rPr lang="en-US" sz="4000" dirty="0">
-                <a:solidFill>
-                  <a:srgbClr val="FFFFFF"/>
-                </a:solidFill>
-                <a:latin typeface="Radley Bold"/>
-              </a:rPr>
-              <a:t>Executable jar</a:t>
-            </a:r>
-            <a:endParaRPr lang="en-US" sz="3799" dirty="0">
-              <a:solidFill>
-                <a:srgbClr val="FFFFFF"/>
-              </a:solidFill>
-              <a:latin typeface="Radley Bold"/>
-            </a:endParaRPr>
-          </a:p>
-        </p:txBody>
-      </p:sp>
+      </p:pic>
     </p:spTree>
+    <p:extLst>
+      <p:ext uri="{BB962C8B-B14F-4D97-AF65-F5344CB8AC3E}">
+        <p14:creationId xmlns:p14="http://schemas.microsoft.com/office/powerpoint/2010/main" val="4035573797"/>
+      </p:ext>
+    </p:extLst>
   </p:cSld>
   <p:clrMapOvr>
     <a:masterClrMapping/>
@@ -4264,372 +3699,78 @@
       </p:grpSpPr>
       <p:sp>
         <p:nvSpPr>
-          <p:cNvPr id="4" name="TextBox 4"/>
+          <p:cNvPr id="2" name="TextBox 2"/>
           <p:cNvSpPr txBox="1"/>
           <p:nvPr/>
         </p:nvSpPr>
         <p:spPr>
           <a:xfrm>
-            <a:off x="1219200" y="1028700"/>
-            <a:ext cx="9906000" cy="1047851"/>
+            <a:off x="1219200" y="800100"/>
+            <a:ext cx="6189679" cy="1076959"/>
           </a:xfrm>
           <a:prstGeom prst="rect">
             <a:avLst/>
           </a:prstGeom>
         </p:spPr>
         <p:txBody>
-          <a:bodyPr wrap="square" lIns="0" tIns="0" rIns="0" bIns="0" rtlCol="0" anchor="t">
+          <a:bodyPr lIns="0" tIns="0" rIns="0" bIns="0" rtlCol="0" anchor="t">
             <a:spAutoFit/>
           </a:bodyPr>
           <a:lstStyle/>
           <a:p>
             <a:pPr marL="0" lvl="0" indent="0">
               <a:lnSpc>
-                <a:spcPts val="8084"/>
+                <a:spcPts val="8304"/>
               </a:lnSpc>
             </a:pPr>
             <a:r>
-              <a:rPr lang="en-US" sz="7349" dirty="0" err="1">
+              <a:rPr lang="en-US" sz="7549" dirty="0">
                 <a:solidFill>
                   <a:srgbClr val="FFFFFF"/>
                 </a:solidFill>
                 <a:latin typeface="Radley Bold"/>
               </a:rPr>
-              <a:t>Zeitplanung</a:t>
-            </a:r>
-            <a:r>
-              <a:rPr lang="en-US" sz="7349" dirty="0">
-                <a:solidFill>
-                  <a:srgbClr val="FFFFFF"/>
-                </a:solidFill>
-                <a:latin typeface="Radley Bold"/>
-              </a:rPr>
-              <a:t> (2 </a:t>
-            </a:r>
-            <a:r>
-              <a:rPr lang="en-US" sz="7349" dirty="0" err="1">
-                <a:solidFill>
-                  <a:srgbClr val="FFFFFF"/>
-                </a:solidFill>
-                <a:latin typeface="Radley Bold"/>
-              </a:rPr>
-              <a:t>Wochen</a:t>
-            </a:r>
-            <a:r>
-              <a:rPr lang="en-US" sz="7349" dirty="0">
-                <a:solidFill>
-                  <a:srgbClr val="FFFFFF"/>
-                </a:solidFill>
-                <a:latin typeface="Radley Bold"/>
-              </a:rPr>
-              <a:t>)</a:t>
-            </a:r>
-          </a:p>
-        </p:txBody>
-      </p:sp>
-      <p:sp>
-        <p:nvSpPr>
-          <p:cNvPr id="2" name="TextBox 3">
+              <a:t>Updates</a:t>
+            </a:r>
+          </a:p>
+        </p:txBody>
+      </p:sp>
+      <p:pic>
+        <p:nvPicPr>
+          <p:cNvPr id="4" name="Grafik 3">
             <a:extLst>
               <a:ext uri="{FF2B5EF4-FFF2-40B4-BE49-F238E27FC236}">
-                <a16:creationId xmlns:a16="http://schemas.microsoft.com/office/drawing/2014/main" id="{EC07FF4A-51AE-44BD-6B5A-042609A01162}"/>
+                <a16:creationId xmlns:a16="http://schemas.microsoft.com/office/drawing/2014/main" id="{B8B6ED8A-4B5B-FEA5-21C1-2680E91FDB9F}"/>
               </a:ext>
             </a:extLst>
           </p:cNvPr>
-          <p:cNvSpPr txBox="1"/>
+          <p:cNvPicPr>
+            <a:picLocks noChangeAspect="1"/>
+          </p:cNvPicPr>
           <p:nvPr/>
-        </p:nvSpPr>
+        </p:nvPicPr>
+        <p:blipFill>
+          <a:blip r:embed="rId2"/>
+          <a:stretch>
+            <a:fillRect/>
+          </a:stretch>
+        </p:blipFill>
         <p:spPr>
           <a:xfrm>
-            <a:off x="1219200" y="2247900"/>
-            <a:ext cx="16459200" cy="6086090"/>
+            <a:off x="0" y="2073252"/>
+            <a:ext cx="18288000" cy="6140496"/>
           </a:xfrm>
           <a:prstGeom prst="rect">
             <a:avLst/>
           </a:prstGeom>
         </p:spPr>
-        <p:txBody>
-          <a:bodyPr wrap="square" lIns="0" tIns="0" rIns="0" bIns="0" rtlCol="0" anchor="t">
-            <a:spAutoFit/>
-          </a:bodyPr>
-          <a:lstStyle/>
-          <a:p>
-            <a:pPr marL="571500" indent="-571500" algn="l">
-              <a:lnSpc>
-                <a:spcPts val="5319"/>
-              </a:lnSpc>
-              <a:spcBef>
-                <a:spcPct val="0"/>
-              </a:spcBef>
-              <a:buFont typeface="Arial" panose="020B0604020202020204" pitchFamily="34" charset="0"/>
-              <a:buChar char="•"/>
-            </a:pPr>
-            <a:r>
-              <a:rPr lang="de-DE" sz="3799" dirty="0">
-                <a:solidFill>
-                  <a:srgbClr val="FFFFFF"/>
-                </a:solidFill>
-                <a:latin typeface="Radley Bold"/>
-              </a:rPr>
-              <a:t>Dynamic </a:t>
-            </a:r>
-            <a:r>
-              <a:rPr lang="de-DE" sz="3799" dirty="0" err="1">
-                <a:solidFill>
-                  <a:srgbClr val="FFFFFF"/>
-                </a:solidFill>
-                <a:latin typeface="Radley Bold"/>
-              </a:rPr>
-              <a:t>analysis</a:t>
-            </a:r>
-            <a:r>
-              <a:rPr lang="de-DE" sz="3799" dirty="0">
-                <a:solidFill>
-                  <a:srgbClr val="FFFFFF"/>
-                </a:solidFill>
-                <a:latin typeface="Radley Bold"/>
-              </a:rPr>
-              <a:t> (Manuel)</a:t>
-            </a:r>
-          </a:p>
-          <a:p>
-            <a:pPr marL="1028700" lvl="1" indent="-571500">
-              <a:lnSpc>
-                <a:spcPts val="5319"/>
-              </a:lnSpc>
-              <a:spcBef>
-                <a:spcPct val="0"/>
-              </a:spcBef>
-              <a:buFont typeface="Arial" panose="020B0604020202020204" pitchFamily="34" charset="0"/>
-              <a:buChar char="•"/>
-            </a:pPr>
-            <a:r>
-              <a:rPr lang="de-DE" sz="3799" dirty="0">
-                <a:solidFill>
-                  <a:srgbClr val="FFFFFF"/>
-                </a:solidFill>
-                <a:latin typeface="Radley Bold"/>
-              </a:rPr>
-              <a:t>Server erreichbar?</a:t>
-            </a:r>
-          </a:p>
-          <a:p>
-            <a:pPr marL="1028700" lvl="1" indent="-571500">
-              <a:lnSpc>
-                <a:spcPts val="5319"/>
-              </a:lnSpc>
-              <a:spcBef>
-                <a:spcPct val="0"/>
-              </a:spcBef>
-              <a:buFont typeface="Arial" panose="020B0604020202020204" pitchFamily="34" charset="0"/>
-              <a:buChar char="•"/>
-            </a:pPr>
-            <a:r>
-              <a:rPr lang="de-DE" sz="3799" dirty="0">
-                <a:solidFill>
-                  <a:srgbClr val="FFFFFF"/>
-                </a:solidFill>
-                <a:latin typeface="Radley Bold"/>
-              </a:rPr>
-              <a:t>User gibt </a:t>
-            </a:r>
-            <a:r>
-              <a:rPr lang="de-DE" sz="3799" dirty="0" err="1">
-                <a:solidFill>
-                  <a:srgbClr val="FFFFFF"/>
-                </a:solidFill>
-                <a:latin typeface="Radley Bold"/>
-              </a:rPr>
-              <a:t>input</a:t>
-            </a:r>
-            <a:r>
-              <a:rPr lang="de-DE" sz="3799" dirty="0">
-                <a:solidFill>
-                  <a:srgbClr val="FFFFFF"/>
-                </a:solidFill>
-                <a:latin typeface="Radley Bold"/>
-              </a:rPr>
-              <a:t> für </a:t>
-            </a:r>
-            <a:r>
-              <a:rPr lang="de-DE" sz="3799" dirty="0" err="1">
-                <a:solidFill>
-                  <a:srgbClr val="FFFFFF"/>
-                </a:solidFill>
-                <a:latin typeface="Radley Bold"/>
-              </a:rPr>
-              <a:t>request</a:t>
-            </a:r>
-            <a:r>
-              <a:rPr lang="de-DE" sz="3799" dirty="0">
-                <a:solidFill>
-                  <a:srgbClr val="FFFFFF"/>
-                </a:solidFill>
-                <a:latin typeface="Radley Bold"/>
-              </a:rPr>
-              <a:t> (Auth wird gespeichert) </a:t>
-            </a:r>
-            <a:r>
-              <a:rPr lang="de-DE" sz="3799" dirty="0">
-                <a:solidFill>
-                  <a:srgbClr val="FFFFFF"/>
-                </a:solidFill>
-                <a:latin typeface="Radley Bold"/>
-                <a:sym typeface="Wingdings" panose="05000000000000000000" pitchFamily="2" charset="2"/>
-              </a:rPr>
-              <a:t> Nur Parameter</a:t>
-            </a:r>
-          </a:p>
-          <a:p>
-            <a:pPr marL="1028700" lvl="1" indent="-571500">
-              <a:lnSpc>
-                <a:spcPts val="5319"/>
-              </a:lnSpc>
-              <a:spcBef>
-                <a:spcPct val="0"/>
-              </a:spcBef>
-              <a:buFont typeface="Arial" panose="020B0604020202020204" pitchFamily="34" charset="0"/>
-              <a:buChar char="•"/>
-            </a:pPr>
-            <a:r>
-              <a:rPr lang="de-DE" sz="3799" dirty="0">
-                <a:solidFill>
-                  <a:srgbClr val="FFFFFF"/>
-                </a:solidFill>
-                <a:latin typeface="Radley Bold"/>
-                <a:sym typeface="Wingdings" panose="05000000000000000000" pitchFamily="2" charset="2"/>
-              </a:rPr>
-              <a:t>Jeder </a:t>
-            </a:r>
-            <a:r>
-              <a:rPr lang="de-DE" sz="3799" dirty="0" err="1">
-                <a:solidFill>
-                  <a:srgbClr val="FFFFFF"/>
-                </a:solidFill>
-                <a:latin typeface="Radley Bold"/>
-                <a:sym typeface="Wingdings" panose="05000000000000000000" pitchFamily="2" charset="2"/>
-              </a:rPr>
-              <a:t>request</a:t>
-            </a:r>
-            <a:r>
-              <a:rPr lang="de-DE" sz="3799" dirty="0">
-                <a:solidFill>
-                  <a:srgbClr val="FFFFFF"/>
-                </a:solidFill>
-                <a:latin typeface="Radley Bold"/>
-                <a:sym typeface="Wingdings" panose="05000000000000000000" pitchFamily="2" charset="2"/>
-              </a:rPr>
-              <a:t> wird validiert</a:t>
-            </a:r>
-            <a:endParaRPr lang="de-DE" sz="3799" dirty="0">
-              <a:solidFill>
-                <a:srgbClr val="FFFFFF"/>
-              </a:solidFill>
-              <a:latin typeface="Radley Bold"/>
-            </a:endParaRPr>
-          </a:p>
-          <a:p>
-            <a:pPr marL="571500" indent="-571500" algn="l">
-              <a:lnSpc>
-                <a:spcPts val="5319"/>
-              </a:lnSpc>
-              <a:spcBef>
-                <a:spcPct val="0"/>
-              </a:spcBef>
-              <a:buFont typeface="Arial" panose="020B0604020202020204" pitchFamily="34" charset="0"/>
-              <a:buChar char="•"/>
-            </a:pPr>
-            <a:r>
-              <a:rPr lang="de-DE" sz="3799" dirty="0">
-                <a:solidFill>
-                  <a:srgbClr val="FFFFFF"/>
-                </a:solidFill>
-                <a:latin typeface="Radley Bold"/>
-              </a:rPr>
-              <a:t>Regeln (Daniel &amp; Tim)</a:t>
-            </a:r>
-          </a:p>
-          <a:p>
-            <a:pPr marL="1028700" lvl="1" indent="-571500">
-              <a:lnSpc>
-                <a:spcPts val="5319"/>
-              </a:lnSpc>
-              <a:spcBef>
-                <a:spcPct val="0"/>
-              </a:spcBef>
-              <a:buFont typeface="Arial" panose="020B0604020202020204" pitchFamily="34" charset="0"/>
-              <a:buChar char="•"/>
-            </a:pPr>
-            <a:r>
-              <a:rPr lang="en-US" sz="3799" dirty="0">
-                <a:solidFill>
-                  <a:srgbClr val="FFFFFF"/>
-                </a:solidFill>
-                <a:latin typeface="Radley Bold"/>
-              </a:rPr>
-              <a:t>A singular noun should be used for document names</a:t>
-            </a:r>
-          </a:p>
-          <a:p>
-            <a:pPr marL="1028700" lvl="1" indent="-571500">
-              <a:lnSpc>
-                <a:spcPts val="5319"/>
-              </a:lnSpc>
-              <a:spcBef>
-                <a:spcPct val="0"/>
-              </a:spcBef>
-              <a:buFont typeface="Arial" panose="020B0604020202020204" pitchFamily="34" charset="0"/>
-              <a:buChar char="•"/>
-            </a:pPr>
-            <a:r>
-              <a:rPr lang="en-US" sz="3799" dirty="0">
-                <a:solidFill>
-                  <a:srgbClr val="FFFFFF"/>
-                </a:solidFill>
-                <a:latin typeface="Radley Bold"/>
-              </a:rPr>
-              <a:t>…</a:t>
-            </a:r>
-          </a:p>
-          <a:p>
-            <a:pPr marL="571500" indent="-571500">
-              <a:lnSpc>
-                <a:spcPts val="5319"/>
-              </a:lnSpc>
-              <a:spcBef>
-                <a:spcPct val="0"/>
-              </a:spcBef>
-              <a:buFont typeface="Arial" panose="020B0604020202020204" pitchFamily="34" charset="0"/>
-              <a:buChar char="•"/>
-            </a:pPr>
-            <a:endParaRPr lang="de-DE" sz="3799" dirty="0">
-              <a:solidFill>
-                <a:srgbClr val="FFFFFF"/>
-              </a:solidFill>
-              <a:latin typeface="Radley Bold"/>
-            </a:endParaRPr>
-          </a:p>
-          <a:p>
-            <a:pPr marL="571500" indent="-571500" algn="l">
-              <a:lnSpc>
-                <a:spcPts val="5319"/>
-              </a:lnSpc>
-              <a:spcBef>
-                <a:spcPct val="0"/>
-              </a:spcBef>
-              <a:buFont typeface="Arial" panose="020B0604020202020204" pitchFamily="34" charset="0"/>
-              <a:buChar char="•"/>
-            </a:pPr>
-            <a:endParaRPr lang="de-DE" sz="3799" dirty="0">
-              <a:solidFill>
-                <a:srgbClr val="FFFFFF"/>
-              </a:solidFill>
-              <a:latin typeface="Radley Bold"/>
-            </a:endParaRPr>
-          </a:p>
-        </p:txBody>
-      </p:sp>
+      </p:pic>
     </p:spTree>
+    <p:extLst>
+      <p:ext uri="{BB962C8B-B14F-4D97-AF65-F5344CB8AC3E}">
+        <p14:creationId xmlns:p14="http://schemas.microsoft.com/office/powerpoint/2010/main" val="3923459175"/>
+      </p:ext>
+    </p:extLst>
   </p:cSld>
   <p:clrMapOvr>
     <a:masterClrMapping/>
@@ -4662,399 +3803,333 @@
           <a:chExt cx="0" cy="0"/>
         </a:xfrm>
       </p:grpSpPr>
-      <p:pic>
-        <p:nvPicPr>
-          <p:cNvPr id="2" name="Picture 2"/>
-          <p:cNvPicPr>
-            <a:picLocks noChangeAspect="1"/>
-          </p:cNvPicPr>
+      <p:sp>
+        <p:nvSpPr>
+          <p:cNvPr id="2" name="TextBox 2"/>
+          <p:cNvSpPr txBox="1"/>
           <p:nvPr/>
-        </p:nvPicPr>
-        <p:blipFill>
-          <a:blip r:embed="rId2" cstate="print">
-            <a:extLst>
-              <a:ext uri="{28A0092B-C50C-407E-A947-70E740481C1C}">
-                <a14:useLocalDpi xmlns:a14="http://schemas.microsoft.com/office/drawing/2010/main" val="0"/>
-              </a:ext>
-              <a:ext uri="{96DAC541-7B7A-43D3-8B79-37D633B846F1}">
-                <asvg:svgBlip xmlns:asvg="http://schemas.microsoft.com/office/drawing/2016/SVG/main" r:embed="rId3"/>
-              </a:ext>
-            </a:extLst>
-          </a:blip>
-          <a:srcRect/>
-          <a:stretch>
-            <a:fillRect/>
-          </a:stretch>
-        </p:blipFill>
+        </p:nvSpPr>
         <p:spPr>
           <a:xfrm>
-            <a:off x="7988132" y="1156420"/>
-            <a:ext cx="631394" cy="838809"/>
+            <a:off x="1219200" y="800100"/>
+            <a:ext cx="6189679" cy="1076959"/>
           </a:xfrm>
           <a:prstGeom prst="rect">
             <a:avLst/>
           </a:prstGeom>
         </p:spPr>
-      </p:pic>
-      <p:pic>
-        <p:nvPicPr>
-          <p:cNvPr id="3" name="Picture 3"/>
-          <p:cNvPicPr>
-            <a:picLocks noChangeAspect="1"/>
-          </p:cNvPicPr>
-          <p:nvPr/>
-        </p:nvPicPr>
-        <p:blipFill>
-          <a:blip r:embed="rId4">
+        <p:txBody>
+          <a:bodyPr lIns="0" tIns="0" rIns="0" bIns="0" rtlCol="0" anchor="t">
+            <a:spAutoFit/>
+          </a:bodyPr>
+          <a:lstStyle/>
+          <a:p>
+            <a:pPr marL="0" lvl="0" indent="0">
+              <a:lnSpc>
+                <a:spcPts val="8304"/>
+              </a:lnSpc>
+            </a:pPr>
+            <a:r>
+              <a:rPr lang="en-US" sz="7549" dirty="0">
+                <a:solidFill>
+                  <a:srgbClr val="FFFFFF"/>
+                </a:solidFill>
+                <a:latin typeface="Radley Bold"/>
+              </a:rPr>
+              <a:t>Updates</a:t>
+            </a:r>
+          </a:p>
+        </p:txBody>
+      </p:sp>
+      <p:sp>
+        <p:nvSpPr>
+          <p:cNvPr id="4" name="TextBox 3">
             <a:extLst>
-              <a:ext uri="{28A0092B-C50C-407E-A947-70E740481C1C}">
-                <a14:useLocalDpi xmlns:a14="http://schemas.microsoft.com/office/drawing/2010/main" val="0"/>
-              </a:ext>
-              <a:ext uri="{96DAC541-7B7A-43D3-8B79-37D633B846F1}">
-                <asvg:svgBlip xmlns:asvg="http://schemas.microsoft.com/office/drawing/2016/SVG/main" r:embed="rId5"/>
+              <a:ext uri="{FF2B5EF4-FFF2-40B4-BE49-F238E27FC236}">
+                <a16:creationId xmlns:a16="http://schemas.microsoft.com/office/drawing/2014/main" id="{B446DB61-E73C-D60B-92D1-2C3348E2B664}"/>
               </a:ext>
             </a:extLst>
-          </a:blip>
-          <a:srcRect/>
-          <a:stretch>
-            <a:fillRect/>
-          </a:stretch>
-        </p:blipFill>
+          </p:cNvPr>
+          <p:cNvSpPr txBox="1"/>
+          <p:nvPr/>
+        </p:nvSpPr>
         <p:spPr>
           <a:xfrm>
-            <a:off x="7988132" y="5593133"/>
-            <a:ext cx="895815" cy="838809"/>
+            <a:off x="1219200" y="2247900"/>
+            <a:ext cx="16459200" cy="6086090"/>
           </a:xfrm>
           <a:prstGeom prst="rect">
             <a:avLst/>
           </a:prstGeom>
         </p:spPr>
-      </p:pic>
-      <p:pic>
-        <p:nvPicPr>
-          <p:cNvPr id="4" name="Picture 4"/>
-          <p:cNvPicPr>
-            <a:picLocks noChangeAspect="1"/>
-          </p:cNvPicPr>
-          <p:nvPr/>
-        </p:nvPicPr>
-        <p:blipFill>
-          <a:blip r:embed="rId6">
-            <a:extLst>
-              <a:ext uri="{28A0092B-C50C-407E-A947-70E740481C1C}">
-                <a14:useLocalDpi xmlns:a14="http://schemas.microsoft.com/office/drawing/2010/main" val="0"/>
-              </a:ext>
-              <a:ext uri="{96DAC541-7B7A-43D3-8B79-37D633B846F1}">
-                <asvg:svgBlip xmlns:asvg="http://schemas.microsoft.com/office/drawing/2016/SVG/main" r:embed="rId7"/>
-              </a:ext>
-            </a:extLst>
-          </a:blip>
-          <a:srcRect/>
-          <a:stretch>
-            <a:fillRect/>
-          </a:stretch>
-        </p:blipFill>
-        <p:spPr>
-          <a:xfrm>
-            <a:off x="13360553" y="1156420"/>
-            <a:ext cx="820508" cy="838809"/>
-          </a:xfrm>
-          <a:prstGeom prst="rect">
-            <a:avLst/>
-          </a:prstGeom>
-        </p:spPr>
-      </p:pic>
-      <p:sp>
-        <p:nvSpPr>
-          <p:cNvPr id="5" name="TextBox 5"/>
-          <p:cNvSpPr txBox="1"/>
-          <p:nvPr/>
-        </p:nvSpPr>
-        <p:spPr>
-          <a:xfrm>
-            <a:off x="1028700" y="4633437"/>
-            <a:ext cx="5285104" cy="1086802"/>
-          </a:xfrm>
-          <a:prstGeom prst="rect">
-            <a:avLst/>
-          </a:prstGeom>
-        </p:spPr>
-        <p:txBody>
-          <a:bodyPr lIns="0" tIns="0" rIns="0" bIns="0" rtlCol="0" anchor="t">
+        <p:txBody>
+          <a:bodyPr wrap="square" lIns="0" tIns="0" rIns="0" bIns="0" rtlCol="0" anchor="t">
             <a:spAutoFit/>
           </a:bodyPr>
           <a:lstStyle/>
           <a:p>
-            <a:pPr marL="0" lvl="0" indent="0">
+            <a:pPr marL="571500" indent="-571500">
               <a:lnSpc>
-                <a:spcPts val="8332"/>
-              </a:lnSpc>
-            </a:pPr>
-            <a:r>
-              <a:rPr lang="en-US" sz="7574">
-                <a:solidFill>
-                  <a:srgbClr val="FFFFFF"/>
-                </a:solidFill>
-                <a:latin typeface="Radley"/>
-              </a:rPr>
-              <a:t>Fragen</a:t>
-            </a:r>
-          </a:p>
-        </p:txBody>
-      </p:sp>
-      <p:sp>
-        <p:nvSpPr>
-          <p:cNvPr id="6" name="TextBox 6"/>
-          <p:cNvSpPr txBox="1"/>
-          <p:nvPr/>
-        </p:nvSpPr>
-        <p:spPr>
-          <a:xfrm>
-            <a:off x="7988132" y="2436072"/>
-            <a:ext cx="3632047" cy="413417"/>
-          </a:xfrm>
-          <a:prstGeom prst="rect">
-            <a:avLst/>
-          </a:prstGeom>
-        </p:spPr>
-        <p:txBody>
-          <a:bodyPr lIns="0" tIns="0" rIns="0" bIns="0" rtlCol="0" anchor="t">
-            <a:spAutoFit/>
-          </a:bodyPr>
-          <a:lstStyle/>
-          <a:p>
-            <a:pPr algn="l">
-              <a:lnSpc>
-                <a:spcPts val="3463"/>
+                <a:spcPts val="5319"/>
               </a:lnSpc>
               <a:spcBef>
                 <a:spcPct val="0"/>
               </a:spcBef>
+              <a:buFont typeface="Arial" panose="020B0604020202020204" pitchFamily="34" charset="0"/>
+              <a:buChar char="•"/>
             </a:pPr>
             <a:r>
-              <a:rPr lang="en-US" sz="2473">
+              <a:rPr lang="de-DE" sz="3799" dirty="0">
                 <a:solidFill>
                   <a:srgbClr val="FFFFFF"/>
                 </a:solidFill>
-                <a:latin typeface="Open Sans"/>
+                <a:latin typeface="Radley Bold"/>
               </a:rPr>
-              <a:t>API Formate</a:t>
-            </a:r>
-          </a:p>
-        </p:txBody>
-      </p:sp>
-      <p:sp>
-        <p:nvSpPr>
-          <p:cNvPr id="7" name="TextBox 7"/>
-          <p:cNvSpPr txBox="1"/>
-          <p:nvPr/>
-        </p:nvSpPr>
-        <p:spPr>
-          <a:xfrm>
-            <a:off x="7988132" y="3252434"/>
-            <a:ext cx="3632047" cy="763270"/>
-          </a:xfrm>
-          <a:prstGeom prst="rect">
-            <a:avLst/>
-          </a:prstGeom>
-        </p:spPr>
-        <p:txBody>
-          <a:bodyPr lIns="0" tIns="0" rIns="0" bIns="0" rtlCol="0" anchor="t">
-            <a:spAutoFit/>
-          </a:bodyPr>
-          <a:lstStyle/>
-          <a:p>
-            <a:pPr marL="0" lvl="0" indent="0">
+              <a:t>Gold </a:t>
+            </a:r>
+            <a:r>
+              <a:rPr lang="de-DE" sz="3799" dirty="0" err="1">
+                <a:solidFill>
+                  <a:srgbClr val="FFFFFF"/>
+                </a:solidFill>
+                <a:latin typeface="Radley Bold"/>
+              </a:rPr>
+              <a:t>standard</a:t>
+            </a:r>
+            <a:endParaRPr lang="de-DE" sz="3799" dirty="0">
+              <a:solidFill>
+                <a:srgbClr val="FFFFFF"/>
+              </a:solidFill>
+              <a:latin typeface="Radley Bold"/>
+            </a:endParaRPr>
+          </a:p>
+          <a:p>
+            <a:pPr marL="1028700" lvl="1" indent="-571500">
               <a:lnSpc>
-                <a:spcPts val="3080"/>
-              </a:lnSpc>
-            </a:pPr>
-            <a:r>
-              <a:rPr lang="en-US" sz="2200" dirty="0" err="1">
-                <a:solidFill>
-                  <a:srgbClr val="FFFFFF"/>
-                </a:solidFill>
-                <a:latin typeface="Open Sans"/>
-              </a:rPr>
-              <a:t>OpenAPI</a:t>
-            </a:r>
-            <a:r>
-              <a:rPr lang="en-US" sz="2200" dirty="0">
-                <a:solidFill>
-                  <a:srgbClr val="FFFFFF"/>
-                </a:solidFill>
-                <a:latin typeface="Open Sans"/>
-              </a:rPr>
-              <a:t>,  RAML, WADL, API Blueprint?</a:t>
-            </a:r>
-          </a:p>
-        </p:txBody>
-      </p:sp>
-      <p:sp>
-        <p:nvSpPr>
-          <p:cNvPr id="8" name="TextBox 8"/>
-          <p:cNvSpPr txBox="1"/>
-          <p:nvPr/>
-        </p:nvSpPr>
-        <p:spPr>
-          <a:xfrm>
-            <a:off x="7988132" y="6887261"/>
-            <a:ext cx="3632047" cy="413417"/>
-          </a:xfrm>
-          <a:prstGeom prst="rect">
-            <a:avLst/>
-          </a:prstGeom>
-        </p:spPr>
-        <p:txBody>
-          <a:bodyPr lIns="0" tIns="0" rIns="0" bIns="0" rtlCol="0" anchor="t">
-            <a:spAutoFit/>
-          </a:bodyPr>
-          <a:lstStyle/>
-          <a:p>
-            <a:pPr algn="l">
-              <a:lnSpc>
-                <a:spcPts val="3463"/>
+                <a:spcPts val="5319"/>
               </a:lnSpc>
               <a:spcBef>
                 <a:spcPct val="0"/>
               </a:spcBef>
+              <a:buFont typeface="Arial" panose="020B0604020202020204" pitchFamily="34" charset="0"/>
+              <a:buChar char="•"/>
             </a:pPr>
             <a:r>
-              <a:rPr lang="en-US" sz="2473">
+              <a:rPr lang="de-DE" sz="3799" dirty="0">
                 <a:solidFill>
                   <a:srgbClr val="FFFFFF"/>
                 </a:solidFill>
-                <a:latin typeface="Open Sans"/>
+                <a:latin typeface="Radley Bold"/>
               </a:rPr>
-              <a:t>Arbeitsraum</a:t>
-            </a:r>
-          </a:p>
-        </p:txBody>
-      </p:sp>
-      <p:sp>
-        <p:nvSpPr>
-          <p:cNvPr id="9" name="TextBox 9"/>
-          <p:cNvSpPr txBox="1"/>
-          <p:nvPr/>
-        </p:nvSpPr>
-        <p:spPr>
-          <a:xfrm>
-            <a:off x="7988132" y="7703623"/>
-            <a:ext cx="3632047" cy="372745"/>
-          </a:xfrm>
-          <a:prstGeom prst="rect">
-            <a:avLst/>
-          </a:prstGeom>
-        </p:spPr>
-        <p:txBody>
-          <a:bodyPr lIns="0" tIns="0" rIns="0" bIns="0" rtlCol="0" anchor="t">
-            <a:spAutoFit/>
-          </a:bodyPr>
-          <a:lstStyle/>
-          <a:p>
-            <a:pPr marL="0" lvl="0" indent="0" algn="l">
+              <a:t>Parsen</a:t>
+            </a:r>
+          </a:p>
+          <a:p>
+            <a:pPr marL="1028700" lvl="1" indent="-571500">
               <a:lnSpc>
-                <a:spcPts val="3080"/>
+                <a:spcPts val="5319"/>
               </a:lnSpc>
               <a:spcBef>
                 <a:spcPct val="0"/>
               </a:spcBef>
+              <a:buFont typeface="Arial" panose="020B0604020202020204" pitchFamily="34" charset="0"/>
+              <a:buChar char="•"/>
             </a:pPr>
             <a:r>
-              <a:rPr lang="en-US" sz="2200">
+              <a:rPr lang="de-DE" sz="3799" dirty="0">
                 <a:solidFill>
                   <a:srgbClr val="FFFFFF"/>
                 </a:solidFill>
-                <a:latin typeface="Open Sans"/>
+                <a:latin typeface="Radley Bold"/>
               </a:rPr>
-              <a:t>Wie ist der Stand?</a:t>
-            </a:r>
-          </a:p>
-        </p:txBody>
-      </p:sp>
-      <p:sp>
-        <p:nvSpPr>
-          <p:cNvPr id="10" name="TextBox 10"/>
-          <p:cNvSpPr txBox="1"/>
-          <p:nvPr/>
-        </p:nvSpPr>
-        <p:spPr>
-          <a:xfrm>
-            <a:off x="13360553" y="2436072"/>
-            <a:ext cx="3898747" cy="413417"/>
-          </a:xfrm>
-          <a:prstGeom prst="rect">
-            <a:avLst/>
-          </a:prstGeom>
-        </p:spPr>
-        <p:txBody>
-          <a:bodyPr lIns="0" tIns="0" rIns="0" bIns="0" rtlCol="0" anchor="t">
-            <a:spAutoFit/>
-          </a:bodyPr>
-          <a:lstStyle/>
-          <a:p>
-            <a:pPr algn="l">
+              <a:t>User/</a:t>
+            </a:r>
+            <a:r>
+              <a:rPr lang="de-DE" sz="3799" dirty="0" err="1">
+                <a:solidFill>
+                  <a:srgbClr val="FFFFFF"/>
+                </a:solidFill>
+                <a:latin typeface="Radley Bold"/>
+              </a:rPr>
+              <a:t>Pet</a:t>
+            </a:r>
+            <a:r>
+              <a:rPr lang="de-DE" sz="3799" dirty="0">
+                <a:solidFill>
+                  <a:srgbClr val="FFFFFF"/>
+                </a:solidFill>
+                <a:latin typeface="Radley Bold"/>
+              </a:rPr>
+              <a:t>/Enterprise</a:t>
+            </a:r>
+          </a:p>
+          <a:p>
+            <a:pPr marL="571500" indent="-571500">
               <a:lnSpc>
-                <a:spcPts val="3463"/>
+                <a:spcPts val="5319"/>
               </a:lnSpc>
               <a:spcBef>
                 <a:spcPct val="0"/>
               </a:spcBef>
+              <a:buFont typeface="Arial" panose="020B0604020202020204" pitchFamily="34" charset="0"/>
+              <a:buChar char="•"/>
             </a:pPr>
             <a:r>
-              <a:rPr lang="en-US" sz="2473">
+              <a:rPr lang="de-DE" sz="3799" dirty="0">
                 <a:solidFill>
                   <a:srgbClr val="FFFFFF"/>
                 </a:solidFill>
-                <a:latin typeface="Open Sans"/>
+                <a:latin typeface="Radley Bold"/>
               </a:rPr>
-              <a:t>Software quality attributes</a:t>
-            </a:r>
-          </a:p>
-        </p:txBody>
-      </p:sp>
-      <p:sp>
-        <p:nvSpPr>
-          <p:cNvPr id="11" name="TextBox 11"/>
-          <p:cNvSpPr txBox="1"/>
-          <p:nvPr/>
-        </p:nvSpPr>
-        <p:spPr>
-          <a:xfrm>
-            <a:off x="13360553" y="3252434"/>
-            <a:ext cx="3632047" cy="1153795"/>
-          </a:xfrm>
-          <a:prstGeom prst="rect">
-            <a:avLst/>
-          </a:prstGeom>
-        </p:spPr>
-        <p:txBody>
-          <a:bodyPr lIns="0" tIns="0" rIns="0" bIns="0" rtlCol="0" anchor="t">
-            <a:spAutoFit/>
-          </a:bodyPr>
-          <a:lstStyle/>
-          <a:p>
-            <a:pPr marL="0" lvl="0" indent="0" algn="l">
+              <a:t>Performance</a:t>
+            </a:r>
+          </a:p>
+          <a:p>
+            <a:pPr marL="1028700" lvl="1" indent="-571500">
               <a:lnSpc>
-                <a:spcPts val="3080"/>
+                <a:spcPts val="5319"/>
               </a:lnSpc>
               <a:spcBef>
                 <a:spcPct val="0"/>
               </a:spcBef>
+              <a:buFont typeface="Arial" panose="020B0604020202020204" pitchFamily="34" charset="0"/>
+              <a:buChar char="•"/>
             </a:pPr>
             <a:r>
-              <a:rPr lang="en-US" sz="2200">
+              <a:rPr lang="de-DE" sz="3799" dirty="0">
                 <a:solidFill>
                   <a:srgbClr val="FFFFFF"/>
                 </a:solidFill>
-                <a:latin typeface="Open Sans"/>
+                <a:latin typeface="Radley Bold"/>
               </a:rPr>
-              <a:t>Regeln wurden Attribute zugewiesen --&gt; Ausreichend? Metriken?</a:t>
-            </a:r>
+              <a:t>Zeit die Funktion auszuführen</a:t>
+            </a:r>
+          </a:p>
+          <a:p>
+            <a:pPr marL="1028700" lvl="1" indent="-571500">
+              <a:lnSpc>
+                <a:spcPts val="5319"/>
+              </a:lnSpc>
+              <a:spcBef>
+                <a:spcPct val="0"/>
+              </a:spcBef>
+              <a:buFont typeface="Arial" panose="020B0604020202020204" pitchFamily="34" charset="0"/>
+              <a:buChar char="•"/>
+            </a:pPr>
+            <a:r>
+              <a:rPr lang="de-DE" sz="3799" dirty="0">
+                <a:solidFill>
+                  <a:srgbClr val="FFFFFF"/>
+                </a:solidFill>
+                <a:latin typeface="Radley Bold"/>
+              </a:rPr>
+              <a:t>Memory </a:t>
+            </a:r>
+            <a:r>
+              <a:rPr lang="de-DE" sz="3799" dirty="0" err="1">
+                <a:solidFill>
+                  <a:srgbClr val="FFFFFF"/>
+                </a:solidFill>
+                <a:latin typeface="Radley Bold"/>
+              </a:rPr>
+              <a:t>usage</a:t>
+            </a:r>
+            <a:endParaRPr lang="de-DE" sz="3799" dirty="0">
+              <a:solidFill>
+                <a:srgbClr val="FFFFFF"/>
+              </a:solidFill>
+              <a:latin typeface="Radley Bold"/>
+            </a:endParaRPr>
+          </a:p>
+          <a:p>
+            <a:pPr marL="571500" indent="-571500">
+              <a:lnSpc>
+                <a:spcPts val="5319"/>
+              </a:lnSpc>
+              <a:spcBef>
+                <a:spcPct val="0"/>
+              </a:spcBef>
+              <a:buFont typeface="Arial" panose="020B0604020202020204" pitchFamily="34" charset="0"/>
+              <a:buChar char="•"/>
+            </a:pPr>
+            <a:r>
+              <a:rPr lang="de-DE" sz="3799" dirty="0" err="1">
+                <a:solidFill>
+                  <a:srgbClr val="FFFFFF"/>
+                </a:solidFill>
+                <a:latin typeface="Radley Bold"/>
+              </a:rPr>
+              <a:t>Effectiveness</a:t>
+            </a:r>
+            <a:endParaRPr lang="de-DE" sz="3799" dirty="0">
+              <a:solidFill>
+                <a:srgbClr val="FFFFFF"/>
+              </a:solidFill>
+              <a:latin typeface="Radley Bold"/>
+            </a:endParaRPr>
+          </a:p>
+          <a:p>
+            <a:pPr marL="1028700" lvl="1" indent="-571500">
+              <a:lnSpc>
+                <a:spcPts val="5319"/>
+              </a:lnSpc>
+              <a:spcBef>
+                <a:spcPct val="0"/>
+              </a:spcBef>
+              <a:buFont typeface="Arial" panose="020B0604020202020204" pitchFamily="34" charset="0"/>
+              <a:buChar char="•"/>
+            </a:pPr>
+            <a:r>
+              <a:rPr lang="de-DE" sz="3799" dirty="0">
+                <a:solidFill>
+                  <a:srgbClr val="FFFFFF"/>
+                </a:solidFill>
+                <a:latin typeface="Radley Bold"/>
+              </a:rPr>
+              <a:t>API </a:t>
+            </a:r>
+            <a:r>
+              <a:rPr lang="de-DE" sz="3799" dirty="0" err="1">
+                <a:solidFill>
+                  <a:srgbClr val="FFFFFF"/>
+                </a:solidFill>
+                <a:latin typeface="Radley Bold"/>
+              </a:rPr>
+              <a:t>Experts</a:t>
+            </a:r>
+            <a:endParaRPr lang="de-DE" sz="3799" dirty="0">
+              <a:solidFill>
+                <a:srgbClr val="FFFFFF"/>
+              </a:solidFill>
+              <a:latin typeface="Radley Bold"/>
+            </a:endParaRPr>
+          </a:p>
+          <a:p>
+            <a:pPr marL="571500" indent="-571500" algn="l">
+              <a:lnSpc>
+                <a:spcPts val="5319"/>
+              </a:lnSpc>
+              <a:spcBef>
+                <a:spcPct val="0"/>
+              </a:spcBef>
+              <a:buFont typeface="Arial" panose="020B0604020202020204" pitchFamily="34" charset="0"/>
+              <a:buChar char="•"/>
+            </a:pPr>
+            <a:endParaRPr lang="de-DE" sz="3799" dirty="0">
+              <a:solidFill>
+                <a:srgbClr val="FFFFFF"/>
+              </a:solidFill>
+              <a:latin typeface="Radley Bold"/>
+            </a:endParaRPr>
           </a:p>
         </p:txBody>
       </p:sp>
     </p:spTree>
+    <p:extLst>
+      <p:ext uri="{BB962C8B-B14F-4D97-AF65-F5344CB8AC3E}">
+        <p14:creationId xmlns:p14="http://schemas.microsoft.com/office/powerpoint/2010/main" val="3717562162"/>
+      </p:ext>
+    </p:extLst>
   </p:cSld>
   <p:clrMapOvr>
     <a:masterClrMapping/>

</xml_diff>